<commit_message>
Update all diplom for Alina added diplom 444, update for her presentation
</commit_message>
<xml_diff>
--- a/2023/Диплом/Алина/Презентация.pptx
+++ b/2023/Диплом/Алина/Презентация.pptx
@@ -1693,7 +1693,7 @@
           <a:p>
             <a:fld id="{21307E79-EC31-48CD-9E48-653B106E2268}" type="datetimeFigureOut">
               <a:rPr lang="ru-RU" smtClean="0"/>
-              <a:t>04.06.2023</a:t>
+              <a:t>19.06.2023</a:t>
             </a:fld>
             <a:endParaRPr lang="ru-RU"/>
           </a:p>
@@ -1944,7 +1944,7 @@
           <a:p>
             <a:fld id="{21307E79-EC31-48CD-9E48-653B106E2268}" type="datetimeFigureOut">
               <a:rPr lang="ru-RU" smtClean="0"/>
-              <a:t>04.06.2023</a:t>
+              <a:t>19.06.2023</a:t>
             </a:fld>
             <a:endParaRPr lang="ru-RU"/>
           </a:p>
@@ -2258,7 +2258,7 @@
           <a:p>
             <a:fld id="{21307E79-EC31-48CD-9E48-653B106E2268}" type="datetimeFigureOut">
               <a:rPr lang="ru-RU" smtClean="0"/>
-              <a:t>04.06.2023</a:t>
+              <a:t>19.06.2023</a:t>
             </a:fld>
             <a:endParaRPr lang="ru-RU"/>
           </a:p>
@@ -2599,7 +2599,7 @@
           <a:p>
             <a:fld id="{21307E79-EC31-48CD-9E48-653B106E2268}" type="datetimeFigureOut">
               <a:rPr lang="ru-RU" smtClean="0"/>
-              <a:t>04.06.2023</a:t>
+              <a:t>19.06.2023</a:t>
             </a:fld>
             <a:endParaRPr lang="ru-RU"/>
           </a:p>
@@ -2913,7 +2913,7 @@
           <a:p>
             <a:fld id="{21307E79-EC31-48CD-9E48-653B106E2268}" type="datetimeFigureOut">
               <a:rPr lang="ru-RU" smtClean="0"/>
-              <a:t>04.06.2023</a:t>
+              <a:t>19.06.2023</a:t>
             </a:fld>
             <a:endParaRPr lang="ru-RU"/>
           </a:p>
@@ -3306,7 +3306,7 @@
           <a:p>
             <a:fld id="{21307E79-EC31-48CD-9E48-653B106E2268}" type="datetimeFigureOut">
               <a:rPr lang="ru-RU" smtClean="0"/>
-              <a:t>04.06.2023</a:t>
+              <a:t>19.06.2023</a:t>
             </a:fld>
             <a:endParaRPr lang="ru-RU"/>
           </a:p>
@@ -3476,7 +3476,7 @@
           <a:p>
             <a:fld id="{21307E79-EC31-48CD-9E48-653B106E2268}" type="datetimeFigureOut">
               <a:rPr lang="ru-RU" smtClean="0"/>
-              <a:t>04.06.2023</a:t>
+              <a:t>19.06.2023</a:t>
             </a:fld>
             <a:endParaRPr lang="ru-RU"/>
           </a:p>
@@ -3656,7 +3656,7 @@
           <a:p>
             <a:fld id="{21307E79-EC31-48CD-9E48-653B106E2268}" type="datetimeFigureOut">
               <a:rPr lang="ru-RU" smtClean="0"/>
-              <a:t>04.06.2023</a:t>
+              <a:t>19.06.2023</a:t>
             </a:fld>
             <a:endParaRPr lang="ru-RU"/>
           </a:p>
@@ -3832,7 +3832,7 @@
           <a:p>
             <a:fld id="{21307E79-EC31-48CD-9E48-653B106E2268}" type="datetimeFigureOut">
               <a:rPr lang="ru-RU" smtClean="0"/>
-              <a:t>04.06.2023</a:t>
+              <a:t>19.06.2023</a:t>
             </a:fld>
             <a:endParaRPr lang="ru-RU"/>
           </a:p>
@@ -4079,7 +4079,7 @@
           <a:p>
             <a:fld id="{21307E79-EC31-48CD-9E48-653B106E2268}" type="datetimeFigureOut">
               <a:rPr lang="ru-RU" smtClean="0"/>
-              <a:t>04.06.2023</a:t>
+              <a:t>19.06.2023</a:t>
             </a:fld>
             <a:endParaRPr lang="ru-RU"/>
           </a:p>
@@ -4311,7 +4311,7 @@
           <a:p>
             <a:fld id="{21307E79-EC31-48CD-9E48-653B106E2268}" type="datetimeFigureOut">
               <a:rPr lang="ru-RU" smtClean="0"/>
-              <a:t>04.06.2023</a:t>
+              <a:t>19.06.2023</a:t>
             </a:fld>
             <a:endParaRPr lang="ru-RU"/>
           </a:p>
@@ -4685,7 +4685,7 @@
           <a:p>
             <a:fld id="{21307E79-EC31-48CD-9E48-653B106E2268}" type="datetimeFigureOut">
               <a:rPr lang="ru-RU" smtClean="0"/>
-              <a:t>04.06.2023</a:t>
+              <a:t>19.06.2023</a:t>
             </a:fld>
             <a:endParaRPr lang="ru-RU"/>
           </a:p>
@@ -4808,7 +4808,7 @@
           <a:p>
             <a:fld id="{21307E79-EC31-48CD-9E48-653B106E2268}" type="datetimeFigureOut">
               <a:rPr lang="ru-RU" smtClean="0"/>
-              <a:t>04.06.2023</a:t>
+              <a:t>19.06.2023</a:t>
             </a:fld>
             <a:endParaRPr lang="ru-RU"/>
           </a:p>
@@ -4903,7 +4903,7 @@
           <a:p>
             <a:fld id="{21307E79-EC31-48CD-9E48-653B106E2268}" type="datetimeFigureOut">
               <a:rPr lang="ru-RU" smtClean="0"/>
-              <a:t>04.06.2023</a:t>
+              <a:t>19.06.2023</a:t>
             </a:fld>
             <a:endParaRPr lang="ru-RU"/>
           </a:p>
@@ -5158,7 +5158,7 @@
           <a:p>
             <a:fld id="{21307E79-EC31-48CD-9E48-653B106E2268}" type="datetimeFigureOut">
               <a:rPr lang="ru-RU" smtClean="0"/>
-              <a:t>04.06.2023</a:t>
+              <a:t>19.06.2023</a:t>
             </a:fld>
             <a:endParaRPr lang="ru-RU"/>
           </a:p>
@@ -5421,7 +5421,7 @@
           <a:p>
             <a:fld id="{21307E79-EC31-48CD-9E48-653B106E2268}" type="datetimeFigureOut">
               <a:rPr lang="ru-RU" smtClean="0"/>
-              <a:t>04.06.2023</a:t>
+              <a:t>19.06.2023</a:t>
             </a:fld>
             <a:endParaRPr lang="ru-RU"/>
           </a:p>
@@ -6164,7 +6164,7 @@
           <a:p>
             <a:fld id="{21307E79-EC31-48CD-9E48-653B106E2268}" type="datetimeFigureOut">
               <a:rPr lang="ru-RU" smtClean="0"/>
-              <a:t>04.06.2023</a:t>
+              <a:t>19.06.2023</a:t>
             </a:fld>
             <a:endParaRPr lang="ru-RU"/>
           </a:p>
@@ -6719,14 +6719,6 @@
               </a:rPr>
               <a:t>Дипломный проект:</a:t>
             </a:r>
-            <a:r>
-              <a:rPr lang="ru-RU" dirty="0">
-                <a:solidFill>
-                  <a:schemeClr val="tx1"/>
-                </a:solidFill>
-              </a:rPr>
-              <a:t/>
-            </a:r>
             <a:br>
               <a:rPr lang="ru-RU" dirty="0">
                 <a:solidFill>
@@ -6780,25 +6772,68 @@
           </a:bodyPr>
           <a:lstStyle/>
           <a:p>
-            <a:pPr algn="r"/>
-            <a:r>
-              <a:rPr lang="ru-RU" sz="3200" dirty="0" smtClean="0">
+            <a:r>
+              <a:rPr lang="ru-RU" sz="3200" dirty="0">
                 <a:solidFill>
                   <a:schemeClr val="tx1"/>
                 </a:solidFill>
               </a:rPr>
-              <a:t>Выполнила: …</a:t>
-            </a:r>
-          </a:p>
-          <a:p>
-            <a:pPr algn="r"/>
-            <a:r>
-              <a:rPr lang="ru-RU" sz="3200" dirty="0" smtClean="0">
+              <a:t>Выполнила: </a:t>
+            </a:r>
+            <a:r>
+              <a:rPr lang="ru-RU" sz="3200" dirty="0">
                 <a:solidFill>
                   <a:schemeClr val="tx1"/>
                 </a:solidFill>
               </a:rPr>
-              <a:t>Проверила: …</a:t>
+              <a:t>Архипова Алина </a:t>
+            </a:r>
+            <a:r>
+              <a:rPr lang="ru-RU" sz="3200" dirty="0" err="1">
+                <a:solidFill>
+                  <a:schemeClr val="tx1"/>
+                </a:solidFill>
+              </a:rPr>
+              <a:t>Айратовна</a:t>
+            </a:r>
+            <a:endParaRPr lang="ru-RU" sz="3200" dirty="0">
+              <a:solidFill>
+                <a:schemeClr val="tx1"/>
+              </a:solidFill>
+            </a:endParaRPr>
+          </a:p>
+          <a:p>
+            <a:r>
+              <a:rPr lang="ru-RU" sz="3200" dirty="0">
+                <a:solidFill>
+                  <a:schemeClr val="tx1"/>
+                </a:solidFill>
+              </a:rPr>
+              <a:t>Проверила: </a:t>
+            </a:r>
+            <a:r>
+              <a:rPr lang="ru-RU" sz="3200" dirty="0" err="1">
+                <a:solidFill>
+                  <a:schemeClr val="tx1"/>
+                </a:solidFill>
+              </a:rPr>
+              <a:t>Барышкова</a:t>
+            </a:r>
+            <a:r>
+              <a:rPr lang="ru-RU" sz="3200" dirty="0">
+                <a:solidFill>
+                  <a:schemeClr val="tx1"/>
+                </a:solidFill>
+              </a:rPr>
+              <a:t> Светлана </a:t>
+            </a:r>
+            <a:r>
+              <a:rPr lang="ru-RU" sz="3200" dirty="0" err="1">
+                <a:solidFill>
+                  <a:schemeClr val="tx1"/>
+                </a:solidFill>
+              </a:rPr>
+              <a:t>Загитовна</a:t>
             </a:r>
             <a:endParaRPr lang="ru-RU" sz="3200" dirty="0">
               <a:solidFill>
@@ -6920,54 +6955,16 @@
               <a:t>ОПИСАНИЕ </a:t>
             </a:r>
             <a:r>
-              <a:rPr lang="ru-RU" sz="3600" dirty="0">
+              <a:rPr lang="ru-RU" sz="3600" dirty="0" smtClean="0">
                 <a:latin typeface="Times New Roman" panose="02020603050405020304" pitchFamily="18" charset="0"/>
                 <a:cs typeface="Times New Roman" panose="02020603050405020304" pitchFamily="18" charset="0"/>
               </a:rPr>
-              <a:t>РЕСТОРАНА «</a:t>
-            </a:r>
-            <a:r>
-              <a:rPr lang="ru-RU" sz="3600" dirty="0" err="1">
-                <a:latin typeface="Times New Roman" panose="02020603050405020304" pitchFamily="18" charset="0"/>
-                <a:cs typeface="Times New Roman" panose="02020603050405020304" pitchFamily="18" charset="0"/>
-              </a:rPr>
-              <a:t>Sapori</a:t>
-            </a:r>
-            <a:r>
-              <a:rPr lang="ru-RU" sz="3600" dirty="0">
-                <a:latin typeface="Times New Roman" panose="02020603050405020304" pitchFamily="18" charset="0"/>
-                <a:cs typeface="Times New Roman" panose="02020603050405020304" pitchFamily="18" charset="0"/>
-              </a:rPr>
-              <a:t> </a:t>
-            </a:r>
-            <a:r>
-              <a:rPr lang="ru-RU" sz="3600" dirty="0" err="1">
-                <a:latin typeface="Times New Roman" panose="02020603050405020304" pitchFamily="18" charset="0"/>
-                <a:cs typeface="Times New Roman" panose="02020603050405020304" pitchFamily="18" charset="0"/>
-              </a:rPr>
-              <a:t>di</a:t>
-            </a:r>
-            <a:r>
-              <a:rPr lang="ru-RU" sz="3600" dirty="0">
-                <a:latin typeface="Times New Roman" panose="02020603050405020304" pitchFamily="18" charset="0"/>
-                <a:cs typeface="Times New Roman" panose="02020603050405020304" pitchFamily="18" charset="0"/>
-              </a:rPr>
-              <a:t> </a:t>
-            </a:r>
-            <a:r>
-              <a:rPr lang="ru-RU" sz="3600" dirty="0" err="1">
-                <a:latin typeface="Times New Roman" panose="02020603050405020304" pitchFamily="18" charset="0"/>
-                <a:cs typeface="Times New Roman" panose="02020603050405020304" pitchFamily="18" charset="0"/>
-              </a:rPr>
-              <a:t>Italia</a:t>
-            </a:r>
-            <a:r>
-              <a:rPr lang="ru-RU" sz="3600" dirty="0">
-                <a:latin typeface="Times New Roman" panose="02020603050405020304" pitchFamily="18" charset="0"/>
-                <a:cs typeface="Times New Roman" panose="02020603050405020304" pitchFamily="18" charset="0"/>
-              </a:rPr>
-              <a:t>»</a:t>
-            </a:r>
+              <a:t>КАФЕ-ПИЦЦЕРИИ «Фиеста Пицца»</a:t>
+            </a:r>
+            <a:endParaRPr lang="ru-RU" sz="3600" dirty="0">
+              <a:latin typeface="Times New Roman" panose="02020603050405020304" pitchFamily="18" charset="0"/>
+              <a:cs typeface="Times New Roman" panose="02020603050405020304" pitchFamily="18" charset="0"/>
+            </a:endParaRPr>
           </a:p>
           <a:p>
             <a:pPr marL="285750" indent="-285750">
@@ -7083,17 +7080,16 @@
         </p:nvSpPr>
         <p:spPr>
           <a:xfrm>
-            <a:off x="1141413" y="618518"/>
-            <a:ext cx="9905998" cy="1141009"/>
+            <a:off x="396517" y="405846"/>
+            <a:ext cx="11698501" cy="1141009"/>
           </a:xfrm>
         </p:spPr>
         <p:txBody>
           <a:bodyPr>
-            <a:normAutofit/>
+            <a:normAutofit fontScale="90000"/>
           </a:bodyPr>
           <a:lstStyle/>
           <a:p>
-            <a:pPr algn="ctr"/>
             <a:r>
               <a:rPr lang="ru-RU" sz="4400" dirty="0">
                 <a:solidFill>
@@ -7102,67 +7098,7 @@
                 <a:latin typeface="Times New Roman" panose="02020603050405020304" pitchFamily="18" charset="0"/>
                 <a:cs typeface="Times New Roman" panose="02020603050405020304" pitchFamily="18" charset="0"/>
               </a:rPr>
-              <a:t>Ресторан «</a:t>
-            </a:r>
-            <a:r>
-              <a:rPr lang="ru-RU" sz="4400" dirty="0" err="1">
-                <a:solidFill>
-                  <a:schemeClr val="tx1"/>
-                </a:solidFill>
-                <a:latin typeface="Times New Roman" panose="02020603050405020304" pitchFamily="18" charset="0"/>
-                <a:cs typeface="Times New Roman" panose="02020603050405020304" pitchFamily="18" charset="0"/>
-              </a:rPr>
-              <a:t>Sapori</a:t>
-            </a:r>
-            <a:r>
-              <a:rPr lang="ru-RU" sz="4400" dirty="0">
-                <a:solidFill>
-                  <a:schemeClr val="tx1"/>
-                </a:solidFill>
-                <a:latin typeface="Times New Roman" panose="02020603050405020304" pitchFamily="18" charset="0"/>
-                <a:cs typeface="Times New Roman" panose="02020603050405020304" pitchFamily="18" charset="0"/>
-              </a:rPr>
-              <a:t> </a:t>
-            </a:r>
-            <a:r>
-              <a:rPr lang="ru-RU" sz="4400" dirty="0" err="1">
-                <a:solidFill>
-                  <a:schemeClr val="tx1"/>
-                </a:solidFill>
-                <a:latin typeface="Times New Roman" panose="02020603050405020304" pitchFamily="18" charset="0"/>
-                <a:cs typeface="Times New Roman" panose="02020603050405020304" pitchFamily="18" charset="0"/>
-              </a:rPr>
-              <a:t>di</a:t>
-            </a:r>
-            <a:r>
-              <a:rPr lang="ru-RU" sz="4400" dirty="0">
-                <a:solidFill>
-                  <a:schemeClr val="tx1"/>
-                </a:solidFill>
-                <a:latin typeface="Times New Roman" panose="02020603050405020304" pitchFamily="18" charset="0"/>
-                <a:cs typeface="Times New Roman" panose="02020603050405020304" pitchFamily="18" charset="0"/>
-              </a:rPr>
-              <a:t> </a:t>
-            </a:r>
-            <a:r>
-              <a:rPr lang="ru-RU" sz="4400" dirty="0" err="1">
-                <a:solidFill>
-                  <a:schemeClr val="tx1"/>
-                </a:solidFill>
-                <a:latin typeface="Times New Roman" panose="02020603050405020304" pitchFamily="18" charset="0"/>
-                <a:cs typeface="Times New Roman" panose="02020603050405020304" pitchFamily="18" charset="0"/>
-              </a:rPr>
-              <a:t>Italia</a:t>
-            </a:r>
-            <a:r>
-              <a:rPr lang="ru-RU" sz="4400" dirty="0">
-                <a:solidFill>
-                  <a:schemeClr val="tx1"/>
-                </a:solidFill>
-                <a:latin typeface="Times New Roman" panose="02020603050405020304" pitchFamily="18" charset="0"/>
-                <a:cs typeface="Times New Roman" panose="02020603050405020304" pitchFamily="18" charset="0"/>
-              </a:rPr>
-              <a:t>»</a:t>
+              <a:t>ОПИСАНИЕ КАФЕ-ПИЦЦЕРИИ «Фиеста Пицца»</a:t>
             </a:r>
             <a:endParaRPr lang="ru-RU" sz="4400" dirty="0">
               <a:solidFill>
@@ -7219,7 +7155,7 @@
       </p:pic>
       <p:pic>
         <p:nvPicPr>
-          <p:cNvPr id="1030" name="Picture 6" descr="https://static.tildacdn.com/tild3537-6632-4830-a361-376430633239/DARK_LOGO.png"/>
+          <p:cNvPr id="1026" name="Picture 2" descr="https://cdn.arora.pro/r/upload/59a0412a-0361-41a3-af2c-92d9ea986bc9/file_manager/theme/logo-new.png?webp&amp;avif&amp;i=20230310&amp;version=P801.41"/>
           <p:cNvPicPr>
             <a:picLocks noChangeAspect="1" noChangeArrowheads="1"/>
           </p:cNvPicPr>
@@ -7240,8 +7176,8 @@
         </p:blipFill>
         <p:spPr bwMode="auto">
           <a:xfrm>
-            <a:off x="133281" y="2849886"/>
-            <a:ext cx="5103737" cy="1638988"/>
+            <a:off x="396517" y="2244436"/>
+            <a:ext cx="4724400" cy="2580408"/>
           </a:xfrm>
           <a:prstGeom prst="rect">
             <a:avLst/>
@@ -7360,7 +7296,7 @@
         <p:spPr bwMode="auto">
           <a:xfrm>
             <a:off x="396759" y="1930832"/>
-            <a:ext cx="3842731" cy="3692640"/>
+            <a:ext cx="2942186" cy="2668877"/>
           </a:xfrm>
           <a:prstGeom prst="rect">
             <a:avLst/>
@@ -7392,8 +7328,41 @@
         </p:blipFill>
         <p:spPr bwMode="auto">
           <a:xfrm>
-            <a:off x="5105315" y="1773382"/>
-            <a:ext cx="4440468" cy="3692640"/>
+            <a:off x="3758002" y="1773382"/>
+            <a:ext cx="3207412" cy="2826327"/>
+          </a:xfrm>
+          <a:prstGeom prst="rect">
+            <a:avLst/>
+          </a:prstGeom>
+          <a:noFill/>
+          <a:ln>
+            <a:noFill/>
+          </a:ln>
+        </p:spPr>
+      </p:pic>
+      <p:pic>
+        <p:nvPicPr>
+          <p:cNvPr id="5" name="Рисунок 4" descr="https://www.russkayaferma.ru/upload/iblock/b76/w4rx4toz1n67ezgup8albifdwvw7fdiw/MC_500A.jpg"/>
+          <p:cNvPicPr/>
+          <p:nvPr/>
+        </p:nvPicPr>
+        <p:blipFill>
+          <a:blip r:embed="rId4" cstate="print">
+            <a:extLst>
+              <a:ext uri="{28A0092B-C50C-407E-A947-70E740481C1C}">
+                <a14:useLocalDpi xmlns:a14="http://schemas.microsoft.com/office/drawing/2010/main" val="0"/>
+              </a:ext>
+            </a:extLst>
+          </a:blip>
+          <a:srcRect/>
+          <a:stretch>
+            <a:fillRect/>
+          </a:stretch>
+        </p:blipFill>
+        <p:spPr bwMode="auto">
+          <a:xfrm>
+            <a:off x="7237000" y="1773382"/>
+            <a:ext cx="3538825" cy="3089563"/>
           </a:xfrm>
           <a:prstGeom prst="rect">
             <a:avLst/>

</xml_diff>